<commit_message>
add ppt to pdf
</commit_message>
<xml_diff>
--- a/pattern recognition/adaboost/adaboost.pptx
+++ b/pattern recognition/adaboost/adaboost.pptx
@@ -250,7 +250,7 @@
           <a:p>
             <a:fld id="{3B210BC0-884A-49CE-B67A-CF6DB0908437}" type="datetimeFigureOut">
               <a:rPr lang="zh-CN" altLang="en-US" smtClean="0"/>
-              <a:t>2019/1/12</a:t>
+              <a:t>2019/1/13</a:t>
             </a:fld>
             <a:endParaRPr lang="zh-CN" altLang="en-US"/>
           </a:p>
@@ -415,7 +415,7 @@
           <a:p>
             <a:fld id="{89F9B634-8C04-4E9F-9712-845F4898F3AB}" type="datetimeFigureOut">
               <a:rPr lang="zh-CN" altLang="en-US" smtClean="0"/>
-              <a:t>2019/1/9</a:t>
+              <a:t>2019/1/13</a:t>
             </a:fld>
             <a:endParaRPr lang="zh-CN" altLang="en-US"/>
           </a:p>
@@ -2326,7 +2326,7 @@
           <a:p>
             <a:fld id="{C764DE79-268F-4C1A-8933-263129D2AF90}" type="datetimeFigureOut">
               <a:rPr lang="en-US" smtClean="0"/>
-              <a:t>1/9/2019</a:t>
+              <a:t>1/13/2019</a:t>
             </a:fld>
             <a:endParaRPr lang="en-US" dirty="0"/>
           </a:p>
@@ -2496,7 +2496,7 @@
           <a:p>
             <a:fld id="{6C77E1FF-3923-49C8-B047-B25E41603F70}" type="datetimeFigureOut">
               <a:rPr lang="zh-CN" altLang="en-US" smtClean="0"/>
-              <a:t>2019/1/9</a:t>
+              <a:t>2019/1/13</a:t>
             </a:fld>
             <a:endParaRPr lang="zh-CN" altLang="en-US"/>
           </a:p>
@@ -2688,7 +2688,7 @@
           <a:p>
             <a:fld id="{6C77E1FF-3923-49C8-B047-B25E41603F70}" type="datetimeFigureOut">
               <a:rPr lang="zh-CN" altLang="en-US" smtClean="0"/>
-              <a:t>2019/1/9</a:t>
+              <a:t>2019/1/13</a:t>
             </a:fld>
             <a:endParaRPr lang="zh-CN" altLang="en-US"/>
           </a:p>
@@ -3094,7 +3094,7 @@
           <a:p>
             <a:fld id="{C764DE79-268F-4C1A-8933-263129D2AF90}" type="datetimeFigureOut">
               <a:rPr lang="en-US" smtClean="0"/>
-              <a:t>1/9/2019</a:t>
+              <a:t>1/13/2019</a:t>
             </a:fld>
             <a:endParaRPr lang="en-US" dirty="0"/>
           </a:p>
@@ -3340,7 +3340,7 @@
           <a:p>
             <a:fld id="{C764DE79-268F-4C1A-8933-263129D2AF90}" type="datetimeFigureOut">
               <a:rPr lang="en-US" smtClean="0"/>
-              <a:t>1/9/2019</a:t>
+              <a:t>1/13/2019</a:t>
             </a:fld>
             <a:endParaRPr lang="en-US" dirty="0"/>
           </a:p>
@@ -3572,7 +3572,7 @@
           <a:p>
             <a:fld id="{6C77E1FF-3923-49C8-B047-B25E41603F70}" type="datetimeFigureOut">
               <a:rPr lang="zh-CN" altLang="en-US" smtClean="0"/>
-              <a:t>2019/1/9</a:t>
+              <a:t>2019/1/13</a:t>
             </a:fld>
             <a:endParaRPr lang="zh-CN" altLang="en-US"/>
           </a:p>
@@ -3951,7 +3951,7 @@
           <a:p>
             <a:fld id="{6C77E1FF-3923-49C8-B047-B25E41603F70}" type="datetimeFigureOut">
               <a:rPr lang="zh-CN" altLang="en-US" smtClean="0"/>
-              <a:t>2019/1/9</a:t>
+              <a:t>2019/1/13</a:t>
             </a:fld>
             <a:endParaRPr lang="zh-CN" altLang="en-US"/>
           </a:p>
@@ -4081,7 +4081,7 @@
           <a:p>
             <a:fld id="{6C77E1FF-3923-49C8-B047-B25E41603F70}" type="datetimeFigureOut">
               <a:rPr lang="zh-CN" altLang="en-US" smtClean="0"/>
-              <a:t>2019/1/9</a:t>
+              <a:t>2019/1/13</a:t>
             </a:fld>
             <a:endParaRPr lang="zh-CN" altLang="en-US"/>
           </a:p>
@@ -4188,7 +4188,7 @@
           <a:p>
             <a:fld id="{6C77E1FF-3923-49C8-B047-B25E41603F70}" type="datetimeFigureOut">
               <a:rPr lang="zh-CN" altLang="en-US" smtClean="0"/>
-              <a:t>2019/1/9</a:t>
+              <a:t>2019/1/13</a:t>
             </a:fld>
             <a:endParaRPr lang="zh-CN" altLang="en-US"/>
           </a:p>
@@ -4477,7 +4477,7 @@
           <a:p>
             <a:fld id="{6C77E1FF-3923-49C8-B047-B25E41603F70}" type="datetimeFigureOut">
               <a:rPr lang="zh-CN" altLang="en-US" smtClean="0"/>
-              <a:t>2019/1/9</a:t>
+              <a:t>2019/1/13</a:t>
             </a:fld>
             <a:endParaRPr lang="zh-CN" altLang="en-US"/>
           </a:p>
@@ -4746,7 +4746,7 @@
           <a:p>
             <a:fld id="{6C77E1FF-3923-49C8-B047-B25E41603F70}" type="datetimeFigureOut">
               <a:rPr lang="zh-CN" altLang="en-US" smtClean="0"/>
-              <a:t>2019/1/9</a:t>
+              <a:t>2019/1/13</a:t>
             </a:fld>
             <a:endParaRPr lang="zh-CN" altLang="en-US"/>
           </a:p>
@@ -4971,7 +4971,7 @@
           <a:p>
             <a:fld id="{C764DE79-268F-4C1A-8933-263129D2AF90}" type="datetimeFigureOut">
               <a:rPr lang="en-US" smtClean="0"/>
-              <a:t>1/9/2019</a:t>
+              <a:t>1/13/2019</a:t>
             </a:fld>
             <a:endParaRPr lang="en-US" dirty="0"/>
           </a:p>
@@ -5391,40 +5391,6 @@
           <a:chExt cx="0" cy="0"/>
         </a:xfrm>
       </p:grpSpPr>
-      <p:sp>
-        <p:nvSpPr>
-          <p:cNvPr id="17" name="矩形 16"/>
-          <p:cNvSpPr/>
-          <p:nvPr/>
-        </p:nvSpPr>
-        <p:spPr>
-          <a:xfrm>
-            <a:off x="5349270" y="3623056"/>
-            <a:ext cx="1569660" cy="646331"/>
-          </a:xfrm>
-          <a:prstGeom prst="rect">
-            <a:avLst/>
-          </a:prstGeom>
-        </p:spPr>
-        <p:txBody>
-          <a:bodyPr wrap="none">
-            <a:spAutoFit/>
-          </a:bodyPr>
-          <a:lstStyle/>
-          <a:p>
-            <a:pPr algn="ctr"/>
-            <a:r>
-              <a:rPr lang="zh-CN" altLang="en-US" sz="3600" dirty="0">
-                <a:solidFill>
-                  <a:schemeClr val="bg1"/>
-                </a:solidFill>
-                <a:latin typeface="+mn-ea"/>
-              </a:rPr>
-              <a:t>关于公</a:t>
-            </a:r>
-          </a:p>
-        </p:txBody>
-      </p:sp>
       <p:sp>
         <p:nvSpPr>
           <p:cNvPr id="3" name="矩形 2"/>
@@ -5896,8 +5862,8 @@
           </a:prstGeom>
         </p:spPr>
       </p:pic>
-      <mc:AlternateContent xmlns:mc="http://schemas.openxmlformats.org/markup-compatibility/2006">
-        <mc:Choice xmlns:a14="http://schemas.microsoft.com/office/drawing/2010/main" Requires="a14">
+      <mc:AlternateContent xmlns:mc="http://schemas.openxmlformats.org/markup-compatibility/2006" xmlns:a14="http://schemas.microsoft.com/office/drawing/2010/main">
+        <mc:Choice Requires="a14">
           <p:sp>
             <p:nvSpPr>
               <p:cNvPr id="10" name="文本框 9">
@@ -6091,7 +6057,7 @@
             </p:txBody>
           </p:sp>
         </mc:Choice>
-        <mc:Fallback>
+        <mc:Fallback xmlns="">
           <p:sp>
             <p:nvSpPr>
               <p:cNvPr id="10" name="文本框 9">
@@ -27288,8 +27254,8 @@
           </a:p>
         </p:txBody>
       </p:sp>
-      <mc:AlternateContent xmlns:mc="http://schemas.openxmlformats.org/markup-compatibility/2006">
-        <mc:Choice xmlns:a14="http://schemas.microsoft.com/office/drawing/2010/main" Requires="a14">
+      <mc:AlternateContent xmlns:mc="http://schemas.openxmlformats.org/markup-compatibility/2006" xmlns:a14="http://schemas.microsoft.com/office/drawing/2010/main">
+        <mc:Choice Requires="a14">
           <p:sp>
             <p:nvSpPr>
               <p:cNvPr id="8" name="文本框 7">
@@ -27722,7 +27688,7 @@
                     <m:f>
                       <m:fPr>
                         <m:ctrlPr>
-                          <a:rPr lang="en-US" altLang="zh-CN" sz="1400" dirty="0" smtClean="0">
+                          <a:rPr lang="en-US" altLang="zh-CN" sz="1400" i="1" dirty="0" smtClean="0">
                             <a:latin typeface="Cambria Math" panose="02040503050406030204" pitchFamily="18" charset="0"/>
                             <a:sym typeface="Wingdings" panose="05000000000000000000" pitchFamily="2" charset="2"/>
                           </a:rPr>
@@ -27732,7 +27698,7 @@
                         <m:sSubSup>
                           <m:sSubSupPr>
                             <m:ctrlPr>
-                              <a:rPr lang="en-US" altLang="zh-CN" sz="1400" dirty="0" smtClean="0">
+                              <a:rPr lang="en-US" altLang="zh-CN" sz="1400" i="1" dirty="0" smtClean="0">
                                 <a:latin typeface="Cambria Math" panose="02040503050406030204" pitchFamily="18" charset="0"/>
                                 <a:sym typeface="Wingdings" panose="05000000000000000000" pitchFamily="2" charset="2"/>
                               </a:rPr>
@@ -27876,6 +27842,7 @@
                 </a:endParaRPr>
               </a:p>
               <a:p>
+                <a:pPr/>
                 <a14:m>
                   <m:oMathPara xmlns:m="http://schemas.openxmlformats.org/officeDocument/2006/math">
                     <m:oMathParaPr>
@@ -27885,7 +27852,7 @@
                       <m:sSub>
                         <m:sSubPr>
                           <m:ctrlPr>
-                            <a:rPr lang="zh-CN" altLang="en-US" sz="1400" dirty="0" smtClean="0">
+                            <a:rPr lang="zh-CN" altLang="en-US" sz="1400" i="1" dirty="0" smtClean="0">
                               <a:latin typeface="Cambria Math" panose="02040503050406030204" pitchFamily="18" charset="0"/>
                               <a:sym typeface="Wingdings" panose="05000000000000000000" pitchFamily="2" charset="2"/>
                             </a:rPr>
@@ -28114,7 +28081,7 @@
                     <m:sSub>
                       <m:sSubPr>
                         <m:ctrlPr>
-                          <a:rPr lang="zh-CN" altLang="en-US" sz="1400" dirty="0" smtClean="0">
+                          <a:rPr lang="zh-CN" altLang="en-US" sz="1400" i="1" dirty="0" smtClean="0">
                             <a:latin typeface="Cambria Math" panose="02040503050406030204" pitchFamily="18" charset="0"/>
                           </a:rPr>
                         </m:ctrlPr>
@@ -28269,7 +28236,7 @@
                     <m:sSub>
                       <m:sSubPr>
                         <m:ctrlPr>
-                          <a:rPr lang="zh-CN" altLang="en-US" sz="1400" dirty="0" smtClean="0">
+                          <a:rPr lang="zh-CN" altLang="en-US" sz="1400" i="1" dirty="0" smtClean="0">
                             <a:latin typeface="Cambria Math" panose="02040503050406030204" pitchFamily="18" charset="0"/>
                           </a:rPr>
                         </m:ctrlPr>
@@ -29190,13 +29157,7 @@
                           <a:rPr lang="en-US" altLang="zh-CN" sz="1400" i="1">
                             <a:latin typeface="Cambria Math" panose="02040503050406030204" pitchFamily="18" charset="0"/>
                           </a:rPr>
-                          <m:t>−</m:t>
-                        </m:r>
-                        <m:r>
-                          <a:rPr lang="en-US" altLang="zh-CN" sz="1400" i="1">
-                            <a:latin typeface="Cambria Math" panose="02040503050406030204" pitchFamily="18" charset="0"/>
-                          </a:rPr>
-                          <m:t>|</m:t>
+                          <m:t>−|</m:t>
                         </m:r>
                         <m:sSub>
                           <m:sSubPr>
@@ -29546,7 +29507,7 @@
             </p:txBody>
           </p:sp>
         </mc:Choice>
-        <mc:Fallback>
+        <mc:Fallback xmlns="">
           <p:sp>
             <p:nvSpPr>
               <p:cNvPr id="8" name="文本框 7">
@@ -29718,8 +29679,8 @@
           </a:p>
         </p:txBody>
       </p:sp>
-      <mc:AlternateContent xmlns:mc="http://schemas.openxmlformats.org/markup-compatibility/2006">
-        <mc:Choice xmlns:a14="http://schemas.microsoft.com/office/drawing/2010/main" Requires="a14">
+      <mc:AlternateContent xmlns:mc="http://schemas.openxmlformats.org/markup-compatibility/2006" xmlns:a14="http://schemas.microsoft.com/office/drawing/2010/main">
+        <mc:Choice Requires="a14">
           <p:sp>
             <p:nvSpPr>
               <p:cNvPr id="2" name="文本框 1">
@@ -29797,19 +29758,13 @@
                       <a:rPr lang="en-US" altLang="zh-CN" sz="1400" i="1" dirty="0">
                         <a:latin typeface="Cambria Math" panose="02040503050406030204" pitchFamily="18" charset="0"/>
                       </a:rPr>
-                      <m:t>-</m:t>
+                      <m:t>−</m:t>
                     </m:r>
                     <m:r>
                       <a:rPr lang="en-US" altLang="zh-CN" sz="1400" b="0" i="1" dirty="0" smtClean="0">
                         <a:latin typeface="Cambria Math" panose="02040503050406030204" pitchFamily="18" charset="0"/>
                       </a:rPr>
-                      <m:t>1</m:t>
-                    </m:r>
-                    <m:r>
-                      <a:rPr lang="en-US" altLang="zh-CN" sz="1400" b="0" i="1" dirty="0" smtClean="0">
-                        <a:latin typeface="Cambria Math" panose="02040503050406030204" pitchFamily="18" charset="0"/>
-                      </a:rPr>
-                      <m:t>,1}</m:t>
+                      <m:t>1,1}</m:t>
                     </m:r>
                   </m:oMath>
                 </a14:m>
@@ -29821,7 +29776,7 @@
             </p:txBody>
           </p:sp>
         </mc:Choice>
-        <mc:Fallback>
+        <mc:Fallback xmlns="">
           <p:sp>
             <p:nvSpPr>
               <p:cNvPr id="2" name="文本框 1">
@@ -30390,8 +30345,8 @@
           </a:fontRef>
         </p:style>
       </p:cxnSp>
-      <mc:AlternateContent xmlns:mc="http://schemas.openxmlformats.org/markup-compatibility/2006">
-        <mc:Choice xmlns:a14="http://schemas.microsoft.com/office/drawing/2010/main" Requires="a14">
+      <mc:AlternateContent xmlns:mc="http://schemas.openxmlformats.org/markup-compatibility/2006" xmlns:a14="http://schemas.microsoft.com/office/drawing/2010/main">
+        <mc:Choice Requires="a14">
           <p:sp>
             <p:nvSpPr>
               <p:cNvPr id="10" name="文本框 9">
@@ -30460,7 +30415,7 @@
             </p:txBody>
           </p:sp>
         </mc:Choice>
-        <mc:Fallback>
+        <mc:Fallback xmlns="">
           <p:sp>
             <p:nvSpPr>
               <p:cNvPr id="10" name="文本框 9">
@@ -30606,8 +30561,8 @@
           </a:fontRef>
         </p:style>
       </p:cxnSp>
-      <mc:AlternateContent xmlns:mc="http://schemas.openxmlformats.org/markup-compatibility/2006">
-        <mc:Choice xmlns:a14="http://schemas.microsoft.com/office/drawing/2010/main" Requires="a14">
+      <mc:AlternateContent xmlns:mc="http://schemas.openxmlformats.org/markup-compatibility/2006" xmlns:a14="http://schemas.microsoft.com/office/drawing/2010/main">
+        <mc:Choice Requires="a14">
           <p:sp>
             <p:nvSpPr>
               <p:cNvPr id="26" name="文本框 25">
@@ -30676,7 +30631,7 @@
             </p:txBody>
           </p:sp>
         </mc:Choice>
-        <mc:Fallback>
+        <mc:Fallback xmlns="">
           <p:sp>
             <p:nvSpPr>
               <p:cNvPr id="26" name="文本框 25">
@@ -30762,8 +30717,8 @@
           </a:fontRef>
         </p:style>
       </p:cxnSp>
-      <mc:AlternateContent xmlns:mc="http://schemas.openxmlformats.org/markup-compatibility/2006">
-        <mc:Choice xmlns:a14="http://schemas.microsoft.com/office/drawing/2010/main" Requires="a14">
+      <mc:AlternateContent xmlns:mc="http://schemas.openxmlformats.org/markup-compatibility/2006" xmlns:a14="http://schemas.microsoft.com/office/drawing/2010/main">
+        <mc:Choice Requires="a14">
           <p:sp>
             <p:nvSpPr>
               <p:cNvPr id="28" name="文本框 27">
@@ -30832,7 +30787,7 @@
             </p:txBody>
           </p:sp>
         </mc:Choice>
-        <mc:Fallback>
+        <mc:Fallback xmlns="">
           <p:sp>
             <p:nvSpPr>
               <p:cNvPr id="28" name="文本框 27">
@@ -32121,8 +32076,8 @@
           </a:fontRef>
         </p:style>
       </p:cxnSp>
-      <mc:AlternateContent xmlns:mc="http://schemas.openxmlformats.org/markup-compatibility/2006">
-        <mc:Choice xmlns:a14="http://schemas.microsoft.com/office/drawing/2010/main" Requires="a14">
+      <mc:AlternateContent xmlns:mc="http://schemas.openxmlformats.org/markup-compatibility/2006" xmlns:a14="http://schemas.microsoft.com/office/drawing/2010/main">
+        <mc:Choice Requires="a14">
           <p:sp>
             <p:nvSpPr>
               <p:cNvPr id="63" name="文本框 62">
@@ -32194,7 +32149,7 @@
             </p:txBody>
           </p:sp>
         </mc:Choice>
-        <mc:Fallback>
+        <mc:Fallback xmlns="">
           <p:sp>
             <p:nvSpPr>
               <p:cNvPr id="63" name="文本框 62">
@@ -32405,8 +32360,8 @@
           </p:sp>
         </mc:Fallback>
       </mc:AlternateContent>
-      <mc:AlternateContent xmlns:mc="http://schemas.openxmlformats.org/markup-compatibility/2006">
-        <mc:Choice xmlns:a14="http://schemas.microsoft.com/office/drawing/2010/main" Requires="a14">
+      <mc:AlternateContent xmlns:mc="http://schemas.openxmlformats.org/markup-compatibility/2006" xmlns:a14="http://schemas.microsoft.com/office/drawing/2010/main">
+        <mc:Choice Requires="a14">
           <p:sp>
             <p:nvSpPr>
               <p:cNvPr id="3" name="矩形 2">
@@ -32557,13 +32512,7 @@
                           <a:rPr lang="en-US" altLang="zh-CN" i="1">
                             <a:latin typeface="Cambria Math" panose="02040503050406030204" pitchFamily="18" charset="0"/>
                           </a:rPr>
-                          <m:t>1</m:t>
-                        </m:r>
-                        <m:r>
-                          <a:rPr lang="en-US" altLang="zh-CN" i="1">
-                            <a:latin typeface="Cambria Math" panose="02040503050406030204" pitchFamily="18" charset="0"/>
-                          </a:rPr>
-                          <m:t>−|</m:t>
+                          <m:t>1−|</m:t>
                         </m:r>
                         <m:sSub>
                           <m:sSubPr>
@@ -32667,13 +32616,7 @@
                           <a:rPr lang="en-US" altLang="zh-CN" i="1">
                             <a:latin typeface="Cambria Math" panose="02040503050406030204" pitchFamily="18" charset="0"/>
                           </a:rPr>
-                          <m:t>|</m:t>
-                        </m:r>
-                        <m:r>
-                          <a:rPr lang="en-US" altLang="zh-CN" i="1">
-                            <a:latin typeface="Cambria Math" panose="02040503050406030204" pitchFamily="18" charset="0"/>
-                          </a:rPr>
-                          <m:t>/2</m:t>
+                          <m:t>|/2</m:t>
                         </m:r>
                       </m:sup>
                     </m:sSup>
@@ -32684,7 +32627,7 @@
             </p:txBody>
           </p:sp>
         </mc:Choice>
-        <mc:Fallback>
+        <mc:Fallback xmlns="">
           <p:sp>
             <p:nvSpPr>
               <p:cNvPr id="3" name="矩形 2">
@@ -32729,8 +32672,8 @@
           </p:sp>
         </mc:Fallback>
       </mc:AlternateContent>
-      <mc:AlternateContent xmlns:mc="http://schemas.openxmlformats.org/markup-compatibility/2006">
-        <mc:Choice xmlns:a14="http://schemas.microsoft.com/office/drawing/2010/main" Requires="a14">
+      <mc:AlternateContent xmlns:mc="http://schemas.openxmlformats.org/markup-compatibility/2006" xmlns:a14="http://schemas.microsoft.com/office/drawing/2010/main">
+        <mc:Choice Requires="a14">
           <p:sp>
             <p:nvSpPr>
               <p:cNvPr id="4" name="矩形 3">
@@ -32758,6 +32701,7 @@
               </a:bodyPr>
               <a:lstStyle/>
               <a:p>
+                <a:pPr/>
                 <a14:m>
                   <m:oMathPara xmlns:m="http://schemas.openxmlformats.org/officeDocument/2006/math">
                     <m:oMathParaPr>
@@ -32872,7 +32816,7 @@
             </p:txBody>
           </p:sp>
         </mc:Choice>
-        <mc:Fallback>
+        <mc:Fallback xmlns="">
           <p:sp>
             <p:nvSpPr>
               <p:cNvPr id="4" name="矩形 3">
@@ -32917,8 +32861,8 @@
           </p:sp>
         </mc:Fallback>
       </mc:AlternateContent>
-      <mc:AlternateContent xmlns:mc="http://schemas.openxmlformats.org/markup-compatibility/2006">
-        <mc:Choice xmlns:a14="http://schemas.microsoft.com/office/drawing/2010/main" Requires="a14">
+      <mc:AlternateContent xmlns:mc="http://schemas.openxmlformats.org/markup-compatibility/2006" xmlns:a14="http://schemas.microsoft.com/office/drawing/2010/main">
+        <mc:Choice Requires="a14">
           <p:sp>
             <p:nvSpPr>
               <p:cNvPr id="7" name="矩形 6">
@@ -32946,6 +32890,7 @@
               </a:bodyPr>
               <a:lstStyle/>
               <a:p>
+                <a:pPr/>
                 <a14:m>
                   <m:oMathPara xmlns:m="http://schemas.openxmlformats.org/officeDocument/2006/math">
                     <m:oMathParaPr>
@@ -33154,7 +33099,7 @@
             </p:txBody>
           </p:sp>
         </mc:Choice>
-        <mc:Fallback>
+        <mc:Fallback xmlns="">
           <p:sp>
             <p:nvSpPr>
               <p:cNvPr id="7" name="矩形 6">

</xml_diff>